<commit_message>
criação das latas de lixo
</commit_message>
<xml_diff>
--- a/Historias/jogos.pptx
+++ b/Historias/jogos.pptx
@@ -6,6 +6,7 @@
   </p:sldMasterIdLst>
   <p:sldIdLst>
     <p:sldId id="256" r:id="rId2"/>
+    <p:sldId id="257" r:id="rId3"/>
   </p:sldIdLst>
   <p:sldSz cx="9144000" cy="6858000" type="screen4x3"/>
   <p:notesSz cx="6858000" cy="9144000"/>
@@ -3603,6 +3604,2077 @@
 </p:sld>
 </file>
 
+<file path=ppt/slides/slide2.xml><?xml version="1.0" encoding="utf-8"?>
+<p:sld xmlns:a="http://schemas.openxmlformats.org/drawingml/2006/main" xmlns:r="http://schemas.openxmlformats.org/officeDocument/2006/relationships" xmlns:p="http://schemas.openxmlformats.org/presentationml/2006/main">
+  <p:cSld>
+    <p:spTree>
+      <p:nvGrpSpPr>
+        <p:cNvPr id="1" name=""/>
+        <p:cNvGrpSpPr/>
+        <p:nvPr/>
+      </p:nvGrpSpPr>
+      <p:grpSpPr>
+        <a:xfrm>
+          <a:off x="0" y="0"/>
+          <a:ext cx="0" cy="0"/>
+          <a:chOff x="0" y="0"/>
+          <a:chExt cx="0" cy="0"/>
+        </a:xfrm>
+      </p:grpSpPr>
+      <p:grpSp>
+        <p:nvGrpSpPr>
+          <p:cNvPr id="33" name="Grupo 32"/>
+          <p:cNvGrpSpPr/>
+          <p:nvPr/>
+        </p:nvGrpSpPr>
+        <p:grpSpPr>
+          <a:xfrm>
+            <a:off x="220528" y="206921"/>
+            <a:ext cx="1636086" cy="2889900"/>
+            <a:chOff x="3393917" y="2699340"/>
+            <a:chExt cx="1636086" cy="2889900"/>
+          </a:xfrm>
+        </p:grpSpPr>
+        <p:sp>
+          <p:nvSpPr>
+            <p:cNvPr id="9" name="Trapezoide 8"/>
+            <p:cNvSpPr/>
+            <p:nvPr/>
+          </p:nvSpPr>
+          <p:spPr>
+            <a:xfrm>
+              <a:off x="3440680" y="2699340"/>
+              <a:ext cx="1528074" cy="794961"/>
+            </a:xfrm>
+            <a:custGeom>
+              <a:avLst/>
+              <a:gdLst/>
+              <a:ahLst/>
+              <a:cxnLst/>
+              <a:rect l="l" t="t" r="r" b="b"/>
+              <a:pathLst>
+                <a:path w="1471972" h="953157">
+                  <a:moveTo>
+                    <a:pt x="220133" y="0"/>
+                  </a:moveTo>
+                  <a:lnTo>
+                    <a:pt x="1251839" y="0"/>
+                  </a:lnTo>
+                  <a:cubicBezTo>
+                    <a:pt x="1293702" y="0"/>
+                    <a:pt x="1327639" y="33937"/>
+                    <a:pt x="1327639" y="75800"/>
+                  </a:cubicBezTo>
+                  <a:lnTo>
+                    <a:pt x="1327639" y="88369"/>
+                  </a:lnTo>
+                  <a:lnTo>
+                    <a:pt x="1471972" y="953157"/>
+                  </a:lnTo>
+                  <a:lnTo>
+                    <a:pt x="0" y="953157"/>
+                  </a:lnTo>
+                  <a:lnTo>
+                    <a:pt x="144333" y="88369"/>
+                  </a:lnTo>
+                  <a:lnTo>
+                    <a:pt x="144333" y="75800"/>
+                  </a:lnTo>
+                  <a:cubicBezTo>
+                    <a:pt x="144333" y="33937"/>
+                    <a:pt x="178270" y="0"/>
+                    <a:pt x="220133" y="0"/>
+                  </a:cubicBezTo>
+                  <a:close/>
+                </a:path>
+              </a:pathLst>
+            </a:custGeom>
+            <a:solidFill>
+              <a:srgbClr val="4CAF50"/>
+            </a:solidFill>
+            <a:ln>
+              <a:noFill/>
+            </a:ln>
+          </p:spPr>
+          <p:style>
+            <a:lnRef idx="2">
+              <a:schemeClr val="accent1">
+                <a:shade val="50000"/>
+              </a:schemeClr>
+            </a:lnRef>
+            <a:fillRef idx="1">
+              <a:schemeClr val="accent1"/>
+            </a:fillRef>
+            <a:effectRef idx="0">
+              <a:schemeClr val="accent1"/>
+            </a:effectRef>
+            <a:fontRef idx="minor">
+              <a:schemeClr val="lt1"/>
+            </a:fontRef>
+          </p:style>
+          <p:txBody>
+            <a:bodyPr rtlCol="0" anchor="ctr"/>
+            <a:lstStyle/>
+            <a:p>
+              <a:pPr algn="ctr"/>
+              <a:endParaRPr lang="pt-BR"/>
+            </a:p>
+          </p:txBody>
+        </p:sp>
+        <p:sp>
+          <p:nvSpPr>
+            <p:cNvPr id="8" name="Retângulo de cantos arredondados 7"/>
+            <p:cNvSpPr/>
+            <p:nvPr/>
+          </p:nvSpPr>
+          <p:spPr>
+            <a:xfrm>
+              <a:off x="3438246" y="3383942"/>
+              <a:ext cx="1548882" cy="2205298"/>
+            </a:xfrm>
+            <a:prstGeom prst="roundRect">
+              <a:avLst>
+                <a:gd name="adj" fmla="val 9439"/>
+              </a:avLst>
+            </a:prstGeom>
+            <a:solidFill>
+              <a:srgbClr val="4CAF50"/>
+            </a:solidFill>
+            <a:ln>
+              <a:noFill/>
+            </a:ln>
+          </p:spPr>
+          <p:style>
+            <a:lnRef idx="2">
+              <a:schemeClr val="accent1">
+                <a:shade val="50000"/>
+              </a:schemeClr>
+            </a:lnRef>
+            <a:fillRef idx="1">
+              <a:schemeClr val="accent1"/>
+            </a:fillRef>
+            <a:effectRef idx="0">
+              <a:schemeClr val="accent1"/>
+            </a:effectRef>
+            <a:fontRef idx="minor">
+              <a:schemeClr val="lt1"/>
+            </a:fontRef>
+          </p:style>
+          <p:txBody>
+            <a:bodyPr rtlCol="0" anchor="ctr"/>
+            <a:lstStyle/>
+            <a:p>
+              <a:pPr algn="ctr"/>
+              <a:endParaRPr lang="pt-BR"/>
+            </a:p>
+          </p:txBody>
+        </p:sp>
+        <p:sp>
+          <p:nvSpPr>
+            <p:cNvPr id="12" name="Retângulo de cantos arredondados 11"/>
+            <p:cNvSpPr/>
+            <p:nvPr/>
+          </p:nvSpPr>
+          <p:spPr>
+            <a:xfrm>
+              <a:off x="3393917" y="3408113"/>
+              <a:ext cx="1636086" cy="172375"/>
+            </a:xfrm>
+            <a:prstGeom prst="roundRect">
+              <a:avLst>
+                <a:gd name="adj" fmla="val 43974"/>
+              </a:avLst>
+            </a:prstGeom>
+            <a:solidFill>
+              <a:srgbClr val="39833D"/>
+            </a:solidFill>
+            <a:ln>
+              <a:noFill/>
+            </a:ln>
+          </p:spPr>
+          <p:style>
+            <a:lnRef idx="2">
+              <a:schemeClr val="accent1">
+                <a:shade val="50000"/>
+              </a:schemeClr>
+            </a:lnRef>
+            <a:fillRef idx="1">
+              <a:schemeClr val="accent1"/>
+            </a:fillRef>
+            <a:effectRef idx="0">
+              <a:schemeClr val="accent1"/>
+            </a:effectRef>
+            <a:fontRef idx="minor">
+              <a:schemeClr val="lt1"/>
+            </a:fontRef>
+          </p:style>
+          <p:txBody>
+            <a:bodyPr rtlCol="0" anchor="ctr"/>
+            <a:lstStyle/>
+            <a:p>
+              <a:pPr algn="ctr"/>
+              <a:endParaRPr lang="pt-BR"/>
+            </a:p>
+          </p:txBody>
+        </p:sp>
+        <p:sp>
+          <p:nvSpPr>
+            <p:cNvPr id="17" name="Trapezoide 8"/>
+            <p:cNvSpPr/>
+            <p:nvPr/>
+          </p:nvSpPr>
+          <p:spPr>
+            <a:xfrm>
+              <a:off x="3734836" y="2780928"/>
+              <a:ext cx="938643" cy="506929"/>
+            </a:xfrm>
+            <a:custGeom>
+              <a:avLst/>
+              <a:gdLst/>
+              <a:ahLst/>
+              <a:cxnLst/>
+              <a:rect l="l" t="t" r="r" b="b"/>
+              <a:pathLst>
+                <a:path w="1471972" h="953157">
+                  <a:moveTo>
+                    <a:pt x="220133" y="0"/>
+                  </a:moveTo>
+                  <a:lnTo>
+                    <a:pt x="1251839" y="0"/>
+                  </a:lnTo>
+                  <a:cubicBezTo>
+                    <a:pt x="1293702" y="0"/>
+                    <a:pt x="1327639" y="33937"/>
+                    <a:pt x="1327639" y="75800"/>
+                  </a:cubicBezTo>
+                  <a:lnTo>
+                    <a:pt x="1327639" y="88369"/>
+                  </a:lnTo>
+                  <a:lnTo>
+                    <a:pt x="1471972" y="953157"/>
+                  </a:lnTo>
+                  <a:lnTo>
+                    <a:pt x="0" y="953157"/>
+                  </a:lnTo>
+                  <a:lnTo>
+                    <a:pt x="144333" y="88369"/>
+                  </a:lnTo>
+                  <a:lnTo>
+                    <a:pt x="144333" y="75800"/>
+                  </a:lnTo>
+                  <a:cubicBezTo>
+                    <a:pt x="144333" y="33937"/>
+                    <a:pt x="178270" y="0"/>
+                    <a:pt x="220133" y="0"/>
+                  </a:cubicBezTo>
+                  <a:close/>
+                </a:path>
+              </a:pathLst>
+            </a:custGeom>
+            <a:solidFill>
+              <a:srgbClr val="39833D"/>
+            </a:solidFill>
+            <a:ln>
+              <a:noFill/>
+            </a:ln>
+          </p:spPr>
+          <p:style>
+            <a:lnRef idx="2">
+              <a:schemeClr val="accent1">
+                <a:shade val="50000"/>
+              </a:schemeClr>
+            </a:lnRef>
+            <a:fillRef idx="1">
+              <a:schemeClr val="accent1"/>
+            </a:fillRef>
+            <a:effectRef idx="0">
+              <a:schemeClr val="accent1"/>
+            </a:effectRef>
+            <a:fontRef idx="minor">
+              <a:schemeClr val="lt1"/>
+            </a:fontRef>
+          </p:style>
+          <p:txBody>
+            <a:bodyPr rtlCol="0" anchor="ctr"/>
+            <a:lstStyle/>
+            <a:p>
+              <a:pPr algn="ctr"/>
+              <a:endParaRPr lang="pt-BR"/>
+            </a:p>
+          </p:txBody>
+        </p:sp>
+        <p:grpSp>
+          <p:nvGrpSpPr>
+            <p:cNvPr id="30" name="Grupo 29"/>
+            <p:cNvGrpSpPr/>
+            <p:nvPr/>
+          </p:nvGrpSpPr>
+          <p:grpSpPr>
+            <a:xfrm>
+              <a:off x="3876980" y="4051164"/>
+              <a:ext cx="669960" cy="981489"/>
+              <a:chOff x="3777709" y="3842612"/>
+              <a:chExt cx="879154" cy="1287957"/>
+            </a:xfrm>
+          </p:grpSpPr>
+          <p:grpSp>
+            <p:nvGrpSpPr>
+              <p:cNvPr id="15" name="Grupo 14"/>
+              <p:cNvGrpSpPr/>
+              <p:nvPr/>
+            </p:nvGrpSpPr>
+            <p:grpSpPr>
+              <a:xfrm>
+                <a:off x="4319344" y="4486590"/>
+                <a:ext cx="337519" cy="563224"/>
+                <a:chOff x="2292126" y="2328482"/>
+                <a:chExt cx="742609" cy="1239204"/>
+              </a:xfrm>
+            </p:grpSpPr>
+            <p:sp>
+              <p:nvSpPr>
+                <p:cNvPr id="10" name="Fluxograma: Atraso 9"/>
+                <p:cNvSpPr/>
+                <p:nvPr/>
+              </p:nvSpPr>
+              <p:spPr>
+                <a:xfrm rot="5400000">
+                  <a:off x="2231382" y="2403844"/>
+                  <a:ext cx="864096" cy="713372"/>
+                </a:xfrm>
+                <a:prstGeom prst="flowChartDelay">
+                  <a:avLst/>
+                </a:prstGeom>
+                <a:solidFill>
+                  <a:schemeClr val="bg1"/>
+                </a:solidFill>
+                <a:ln>
+                  <a:noFill/>
+                </a:ln>
+              </p:spPr>
+              <p:style>
+                <a:lnRef idx="2">
+                  <a:schemeClr val="accent1">
+                    <a:shade val="50000"/>
+                  </a:schemeClr>
+                </a:lnRef>
+                <a:fillRef idx="1">
+                  <a:schemeClr val="accent1"/>
+                </a:fillRef>
+                <a:effectRef idx="0">
+                  <a:schemeClr val="accent1"/>
+                </a:effectRef>
+                <a:fontRef idx="minor">
+                  <a:schemeClr val="lt1"/>
+                </a:fontRef>
+              </p:style>
+              <p:txBody>
+                <a:bodyPr rtlCol="0" anchor="ctr"/>
+                <a:lstStyle/>
+                <a:p>
+                  <a:pPr algn="ctr"/>
+                  <a:endParaRPr lang="pt-BR"/>
+                </a:p>
+              </p:txBody>
+            </p:sp>
+            <p:sp>
+              <p:nvSpPr>
+                <p:cNvPr id="11" name="Retângulo 10"/>
+                <p:cNvSpPr/>
+                <p:nvPr/>
+              </p:nvSpPr>
+              <p:spPr>
+                <a:xfrm>
+                  <a:off x="2567227" y="2869978"/>
+                  <a:ext cx="192405" cy="645199"/>
+                </a:xfrm>
+                <a:prstGeom prst="rect">
+                  <a:avLst/>
+                </a:prstGeom>
+                <a:solidFill>
+                  <a:schemeClr val="bg1"/>
+                </a:solidFill>
+                <a:ln>
+                  <a:noFill/>
+                </a:ln>
+              </p:spPr>
+              <p:style>
+                <a:lnRef idx="2">
+                  <a:schemeClr val="accent1">
+                    <a:shade val="50000"/>
+                  </a:schemeClr>
+                </a:lnRef>
+                <a:fillRef idx="1">
+                  <a:schemeClr val="accent1"/>
+                </a:fillRef>
+                <a:effectRef idx="0">
+                  <a:schemeClr val="accent1"/>
+                </a:effectRef>
+                <a:fontRef idx="minor">
+                  <a:schemeClr val="lt1"/>
+                </a:fontRef>
+              </p:style>
+              <p:txBody>
+                <a:bodyPr rtlCol="0" anchor="ctr"/>
+                <a:lstStyle/>
+                <a:p>
+                  <a:pPr algn="ctr"/>
+                  <a:endParaRPr lang="pt-BR"/>
+                </a:p>
+              </p:txBody>
+            </p:sp>
+            <p:sp>
+              <p:nvSpPr>
+                <p:cNvPr id="14" name="Fluxograma: Atraso 13"/>
+                <p:cNvSpPr/>
+                <p:nvPr/>
+              </p:nvSpPr>
+              <p:spPr>
+                <a:xfrm rot="16200000">
+                  <a:off x="2610923" y="3143873"/>
+                  <a:ext cx="105016" cy="742609"/>
+                </a:xfrm>
+                <a:prstGeom prst="flowChartDelay">
+                  <a:avLst/>
+                </a:prstGeom>
+                <a:solidFill>
+                  <a:schemeClr val="bg1"/>
+                </a:solidFill>
+                <a:ln>
+                  <a:noFill/>
+                </a:ln>
+              </p:spPr>
+              <p:style>
+                <a:lnRef idx="2">
+                  <a:schemeClr val="accent1">
+                    <a:shade val="50000"/>
+                  </a:schemeClr>
+                </a:lnRef>
+                <a:fillRef idx="1">
+                  <a:schemeClr val="accent1"/>
+                </a:fillRef>
+                <a:effectRef idx="0">
+                  <a:schemeClr val="accent1"/>
+                </a:effectRef>
+                <a:fontRef idx="minor">
+                  <a:schemeClr val="lt1"/>
+                </a:fontRef>
+              </p:style>
+              <p:txBody>
+                <a:bodyPr rtlCol="0" anchor="ctr"/>
+                <a:lstStyle/>
+                <a:p>
+                  <a:pPr algn="ctr"/>
+                  <a:endParaRPr lang="pt-BR"/>
+                </a:p>
+              </p:txBody>
+            </p:sp>
+          </p:grpSp>
+          <p:sp>
+            <p:nvSpPr>
+              <p:cNvPr id="27" name="Retângulo de cantos arredondados 26"/>
+              <p:cNvSpPr/>
+              <p:nvPr/>
+            </p:nvSpPr>
+            <p:spPr>
+              <a:xfrm>
+                <a:off x="3777709" y="3842612"/>
+                <a:ext cx="318965" cy="1287957"/>
+              </a:xfrm>
+              <a:custGeom>
+                <a:avLst/>
+                <a:gdLst/>
+                <a:ahLst/>
+                <a:cxnLst/>
+                <a:rect l="l" t="t" r="r" b="b"/>
+                <a:pathLst>
+                  <a:path w="550111" h="2221309">
+                    <a:moveTo>
+                      <a:pt x="167045" y="0"/>
+                    </a:moveTo>
+                    <a:lnTo>
+                      <a:pt x="383069" y="0"/>
+                    </a:lnTo>
+                    <a:lnTo>
+                      <a:pt x="383069" y="654964"/>
+                    </a:lnTo>
+                    <a:cubicBezTo>
+                      <a:pt x="481312" y="688440"/>
+                      <a:pt x="550111" y="766539"/>
+                      <a:pt x="550111" y="857513"/>
+                    </a:cubicBezTo>
+                    <a:lnTo>
+                      <a:pt x="550111" y="1077893"/>
+                    </a:lnTo>
+                    <a:lnTo>
+                      <a:pt x="549613" y="1077893"/>
+                    </a:lnTo>
+                    <a:cubicBezTo>
+                      <a:pt x="550103" y="1078706"/>
+                      <a:pt x="550109" y="1079528"/>
+                      <a:pt x="550109" y="1080351"/>
+                    </a:cubicBezTo>
+                    <a:lnTo>
+                      <a:pt x="550109" y="2066123"/>
+                    </a:lnTo>
+                    <a:cubicBezTo>
+                      <a:pt x="550109" y="2151830"/>
+                      <a:pt x="480630" y="2221309"/>
+                      <a:pt x="394923" y="2221309"/>
+                    </a:cubicBezTo>
+                    <a:lnTo>
+                      <a:pt x="155186" y="2221309"/>
+                    </a:lnTo>
+                    <a:cubicBezTo>
+                      <a:pt x="69479" y="2221309"/>
+                      <a:pt x="0" y="2151830"/>
+                      <a:pt x="0" y="2066123"/>
+                    </a:cubicBezTo>
+                    <a:lnTo>
+                      <a:pt x="0" y="1080351"/>
+                    </a:lnTo>
+                    <a:lnTo>
+                      <a:pt x="496" y="1077893"/>
+                    </a:lnTo>
+                    <a:lnTo>
+                      <a:pt x="3" y="1077893"/>
+                    </a:lnTo>
+                    <a:lnTo>
+                      <a:pt x="3" y="857513"/>
+                    </a:lnTo>
+                    <a:cubicBezTo>
+                      <a:pt x="3" y="766539"/>
+                      <a:pt x="68802" y="688440"/>
+                      <a:pt x="167045" y="654964"/>
+                    </a:cubicBezTo>
+                    <a:close/>
+                  </a:path>
+                </a:pathLst>
+              </a:custGeom>
+              <a:solidFill>
+                <a:schemeClr val="bg1"/>
+              </a:solidFill>
+              <a:ln>
+                <a:noFill/>
+              </a:ln>
+            </p:spPr>
+            <p:style>
+              <a:lnRef idx="2">
+                <a:schemeClr val="accent1">
+                  <a:shade val="50000"/>
+                </a:schemeClr>
+              </a:lnRef>
+              <a:fillRef idx="1">
+                <a:schemeClr val="accent1"/>
+              </a:fillRef>
+              <a:effectRef idx="0">
+                <a:schemeClr val="accent1"/>
+              </a:effectRef>
+              <a:fontRef idx="minor">
+                <a:schemeClr val="lt1"/>
+              </a:fontRef>
+            </p:style>
+            <p:txBody>
+              <a:bodyPr rtlCol="0" anchor="ctr"/>
+              <a:lstStyle/>
+              <a:p>
+                <a:pPr algn="ctr"/>
+                <a:endParaRPr lang="pt-BR"/>
+              </a:p>
+            </p:txBody>
+          </p:sp>
+        </p:grpSp>
+      </p:grpSp>
+      <p:grpSp>
+        <p:nvGrpSpPr>
+          <p:cNvPr id="50" name="Grupo 49"/>
+          <p:cNvGrpSpPr/>
+          <p:nvPr/>
+        </p:nvGrpSpPr>
+        <p:grpSpPr>
+          <a:xfrm>
+            <a:off x="2035530" y="175557"/>
+            <a:ext cx="1636086" cy="3053217"/>
+            <a:chOff x="2035530" y="175557"/>
+            <a:chExt cx="1636086" cy="3053217"/>
+          </a:xfrm>
+        </p:grpSpPr>
+        <p:grpSp>
+          <p:nvGrpSpPr>
+            <p:cNvPr id="36" name="Grupo 35"/>
+            <p:cNvGrpSpPr/>
+            <p:nvPr/>
+          </p:nvGrpSpPr>
+          <p:grpSpPr>
+            <a:xfrm>
+              <a:off x="2035530" y="175557"/>
+              <a:ext cx="1636086" cy="2889900"/>
+              <a:chOff x="2007391" y="190080"/>
+              <a:chExt cx="1636086" cy="2889900"/>
+            </a:xfrm>
+          </p:grpSpPr>
+          <p:sp>
+            <p:nvSpPr>
+              <p:cNvPr id="54" name="Trapezoide 8"/>
+              <p:cNvSpPr/>
+              <p:nvPr/>
+            </p:nvSpPr>
+            <p:spPr>
+              <a:xfrm>
+                <a:off x="2054154" y="190080"/>
+                <a:ext cx="1528074" cy="794961"/>
+              </a:xfrm>
+              <a:custGeom>
+                <a:avLst/>
+                <a:gdLst/>
+                <a:ahLst/>
+                <a:cxnLst/>
+                <a:rect l="l" t="t" r="r" b="b"/>
+                <a:pathLst>
+                  <a:path w="1471972" h="953157">
+                    <a:moveTo>
+                      <a:pt x="220133" y="0"/>
+                    </a:moveTo>
+                    <a:lnTo>
+                      <a:pt x="1251839" y="0"/>
+                    </a:lnTo>
+                    <a:cubicBezTo>
+                      <a:pt x="1293702" y="0"/>
+                      <a:pt x="1327639" y="33937"/>
+                      <a:pt x="1327639" y="75800"/>
+                    </a:cubicBezTo>
+                    <a:lnTo>
+                      <a:pt x="1327639" y="88369"/>
+                    </a:lnTo>
+                    <a:lnTo>
+                      <a:pt x="1471972" y="953157"/>
+                    </a:lnTo>
+                    <a:lnTo>
+                      <a:pt x="0" y="953157"/>
+                    </a:lnTo>
+                    <a:lnTo>
+                      <a:pt x="144333" y="88369"/>
+                    </a:lnTo>
+                    <a:lnTo>
+                      <a:pt x="144333" y="75800"/>
+                    </a:lnTo>
+                    <a:cubicBezTo>
+                      <a:pt x="144333" y="33937"/>
+                      <a:pt x="178270" y="0"/>
+                      <a:pt x="220133" y="0"/>
+                    </a:cubicBezTo>
+                    <a:close/>
+                  </a:path>
+                </a:pathLst>
+              </a:custGeom>
+              <a:solidFill>
+                <a:srgbClr val="E03935"/>
+              </a:solidFill>
+              <a:ln>
+                <a:noFill/>
+              </a:ln>
+            </p:spPr>
+            <p:style>
+              <a:lnRef idx="2">
+                <a:schemeClr val="accent1">
+                  <a:shade val="50000"/>
+                </a:schemeClr>
+              </a:lnRef>
+              <a:fillRef idx="1">
+                <a:schemeClr val="accent1"/>
+              </a:fillRef>
+              <a:effectRef idx="0">
+                <a:schemeClr val="accent1"/>
+              </a:effectRef>
+              <a:fontRef idx="minor">
+                <a:schemeClr val="lt1"/>
+              </a:fontRef>
+            </p:style>
+            <p:txBody>
+              <a:bodyPr rtlCol="0" anchor="ctr"/>
+              <a:lstStyle/>
+              <a:p>
+                <a:pPr algn="ctr"/>
+                <a:endParaRPr lang="pt-BR"/>
+              </a:p>
+            </p:txBody>
+          </p:sp>
+          <p:sp>
+            <p:nvSpPr>
+              <p:cNvPr id="55" name="Retângulo de cantos arredondados 54"/>
+              <p:cNvSpPr/>
+              <p:nvPr/>
+            </p:nvSpPr>
+            <p:spPr>
+              <a:xfrm>
+                <a:off x="2051720" y="874682"/>
+                <a:ext cx="1548882" cy="2205298"/>
+              </a:xfrm>
+              <a:prstGeom prst="roundRect">
+                <a:avLst>
+                  <a:gd name="adj" fmla="val 9439"/>
+                </a:avLst>
+              </a:prstGeom>
+              <a:solidFill>
+                <a:srgbClr val="E03935"/>
+              </a:solidFill>
+              <a:ln>
+                <a:noFill/>
+              </a:ln>
+            </p:spPr>
+            <p:style>
+              <a:lnRef idx="2">
+                <a:schemeClr val="accent1">
+                  <a:shade val="50000"/>
+                </a:schemeClr>
+              </a:lnRef>
+              <a:fillRef idx="1">
+                <a:schemeClr val="accent1"/>
+              </a:fillRef>
+              <a:effectRef idx="0">
+                <a:schemeClr val="accent1"/>
+              </a:effectRef>
+              <a:fontRef idx="minor">
+                <a:schemeClr val="lt1"/>
+              </a:fontRef>
+            </p:style>
+            <p:txBody>
+              <a:bodyPr rtlCol="0" anchor="ctr"/>
+              <a:lstStyle/>
+              <a:p>
+                <a:pPr algn="ctr"/>
+                <a:endParaRPr lang="pt-BR"/>
+              </a:p>
+            </p:txBody>
+          </p:sp>
+          <p:sp>
+            <p:nvSpPr>
+              <p:cNvPr id="56" name="Retângulo de cantos arredondados 55"/>
+              <p:cNvSpPr/>
+              <p:nvPr/>
+            </p:nvSpPr>
+            <p:spPr>
+              <a:xfrm>
+                <a:off x="2007391" y="898853"/>
+                <a:ext cx="1636086" cy="172375"/>
+              </a:xfrm>
+              <a:prstGeom prst="roundRect">
+                <a:avLst>
+                  <a:gd name="adj" fmla="val 43974"/>
+                </a:avLst>
+              </a:prstGeom>
+              <a:solidFill>
+                <a:srgbClr val="7F1613"/>
+              </a:solidFill>
+              <a:ln>
+                <a:noFill/>
+              </a:ln>
+            </p:spPr>
+            <p:style>
+              <a:lnRef idx="2">
+                <a:schemeClr val="accent1">
+                  <a:shade val="50000"/>
+                </a:schemeClr>
+              </a:lnRef>
+              <a:fillRef idx="1">
+                <a:schemeClr val="accent1"/>
+              </a:fillRef>
+              <a:effectRef idx="0">
+                <a:schemeClr val="accent1"/>
+              </a:effectRef>
+              <a:fontRef idx="minor">
+                <a:schemeClr val="lt1"/>
+              </a:fontRef>
+            </p:style>
+            <p:txBody>
+              <a:bodyPr rtlCol="0" anchor="ctr"/>
+              <a:lstStyle/>
+              <a:p>
+                <a:pPr algn="ctr"/>
+                <a:endParaRPr lang="pt-BR"/>
+              </a:p>
+            </p:txBody>
+          </p:sp>
+          <p:sp>
+            <p:nvSpPr>
+              <p:cNvPr id="57" name="Trapezoide 8"/>
+              <p:cNvSpPr/>
+              <p:nvPr/>
+            </p:nvSpPr>
+            <p:spPr>
+              <a:xfrm>
+                <a:off x="2348310" y="271668"/>
+                <a:ext cx="938643" cy="506929"/>
+              </a:xfrm>
+              <a:custGeom>
+                <a:avLst/>
+                <a:gdLst/>
+                <a:ahLst/>
+                <a:cxnLst/>
+                <a:rect l="l" t="t" r="r" b="b"/>
+                <a:pathLst>
+                  <a:path w="1471972" h="953157">
+                    <a:moveTo>
+                      <a:pt x="220133" y="0"/>
+                    </a:moveTo>
+                    <a:lnTo>
+                      <a:pt x="1251839" y="0"/>
+                    </a:lnTo>
+                    <a:cubicBezTo>
+                      <a:pt x="1293702" y="0"/>
+                      <a:pt x="1327639" y="33937"/>
+                      <a:pt x="1327639" y="75800"/>
+                    </a:cubicBezTo>
+                    <a:lnTo>
+                      <a:pt x="1327639" y="88369"/>
+                    </a:lnTo>
+                    <a:lnTo>
+                      <a:pt x="1471972" y="953157"/>
+                    </a:lnTo>
+                    <a:lnTo>
+                      <a:pt x="0" y="953157"/>
+                    </a:lnTo>
+                    <a:lnTo>
+                      <a:pt x="144333" y="88369"/>
+                    </a:lnTo>
+                    <a:lnTo>
+                      <a:pt x="144333" y="75800"/>
+                    </a:lnTo>
+                    <a:cubicBezTo>
+                      <a:pt x="144333" y="33937"/>
+                      <a:pt x="178270" y="0"/>
+                      <a:pt x="220133" y="0"/>
+                    </a:cubicBezTo>
+                    <a:close/>
+                  </a:path>
+                </a:pathLst>
+              </a:custGeom>
+              <a:solidFill>
+                <a:srgbClr val="7F1613"/>
+              </a:solidFill>
+              <a:ln>
+                <a:noFill/>
+              </a:ln>
+            </p:spPr>
+            <p:style>
+              <a:lnRef idx="2">
+                <a:schemeClr val="accent1">
+                  <a:shade val="50000"/>
+                </a:schemeClr>
+              </a:lnRef>
+              <a:fillRef idx="1">
+                <a:schemeClr val="accent1"/>
+              </a:fillRef>
+              <a:effectRef idx="0">
+                <a:schemeClr val="accent1"/>
+              </a:effectRef>
+              <a:fontRef idx="minor">
+                <a:schemeClr val="lt1"/>
+              </a:fontRef>
+            </p:style>
+            <p:txBody>
+              <a:bodyPr rtlCol="0" anchor="ctr"/>
+              <a:lstStyle/>
+              <a:p>
+                <a:pPr algn="ctr"/>
+                <a:endParaRPr lang="pt-BR"/>
+              </a:p>
+            </p:txBody>
+          </p:sp>
+        </p:grpSp>
+        <p:sp>
+          <p:nvSpPr>
+            <p:cNvPr id="37" name="Retângulo de cantos arredondados 36"/>
+            <p:cNvSpPr/>
+            <p:nvPr/>
+          </p:nvSpPr>
+          <p:spPr>
+            <a:xfrm>
+              <a:off x="2160953" y="3074739"/>
+              <a:ext cx="288032" cy="154035"/>
+            </a:xfrm>
+            <a:prstGeom prst="roundRect">
+              <a:avLst/>
+            </a:prstGeom>
+            <a:solidFill>
+              <a:schemeClr val="bg1"/>
+            </a:solidFill>
+            <a:ln>
+              <a:noFill/>
+            </a:ln>
+          </p:spPr>
+          <p:style>
+            <a:lnRef idx="2">
+              <a:schemeClr val="accent1">
+                <a:shade val="50000"/>
+              </a:schemeClr>
+            </a:lnRef>
+            <a:fillRef idx="1">
+              <a:schemeClr val="accent1"/>
+            </a:fillRef>
+            <a:effectRef idx="0">
+              <a:schemeClr val="accent1"/>
+            </a:effectRef>
+            <a:fontRef idx="minor">
+              <a:schemeClr val="lt1"/>
+            </a:fontRef>
+          </p:style>
+          <p:txBody>
+            <a:bodyPr rtlCol="0" anchor="ctr"/>
+            <a:lstStyle/>
+            <a:p>
+              <a:pPr algn="ctr"/>
+              <a:endParaRPr lang="pt-BR"/>
+            </a:p>
+          </p:txBody>
+        </p:sp>
+        <p:sp>
+          <p:nvSpPr>
+            <p:cNvPr id="38" name="Fluxograma: Atraso 37"/>
+            <p:cNvSpPr/>
+            <p:nvPr/>
+          </p:nvSpPr>
+          <p:spPr>
+            <a:xfrm rot="16200000">
+              <a:off x="2302051" y="1793189"/>
+              <a:ext cx="1104497" cy="401965"/>
+            </a:xfrm>
+            <a:custGeom>
+              <a:avLst/>
+              <a:gdLst/>
+              <a:ahLst/>
+              <a:cxnLst/>
+              <a:rect l="l" t="t" r="r" b="b"/>
+              <a:pathLst>
+                <a:path w="1252947" h="455991">
+                  <a:moveTo>
+                    <a:pt x="1252947" y="133605"/>
+                  </a:moveTo>
+                  <a:lnTo>
+                    <a:pt x="1252947" y="322385"/>
+                  </a:lnTo>
+                  <a:cubicBezTo>
+                    <a:pt x="1252947" y="329908"/>
+                    <a:pt x="1246848" y="336007"/>
+                    <a:pt x="1239325" y="336007"/>
+                  </a:cubicBezTo>
+                  <a:lnTo>
+                    <a:pt x="1184836" y="336007"/>
+                  </a:lnTo>
+                  <a:cubicBezTo>
+                    <a:pt x="1177603" y="336007"/>
+                    <a:pt x="1171686" y="330369"/>
+                    <a:pt x="1171563" y="323228"/>
+                  </a:cubicBezTo>
+                  <a:lnTo>
+                    <a:pt x="1119798" y="323228"/>
+                  </a:lnTo>
+                  <a:cubicBezTo>
+                    <a:pt x="1087587" y="400282"/>
+                    <a:pt x="1016922" y="453409"/>
+                    <a:pt x="935041" y="453409"/>
+                  </a:cubicBezTo>
+                  <a:lnTo>
+                    <a:pt x="730118" y="453408"/>
+                  </a:lnTo>
+                  <a:lnTo>
+                    <a:pt x="730118" y="438427"/>
+                  </a:lnTo>
+                  <a:lnTo>
+                    <a:pt x="707652" y="438427"/>
+                  </a:lnTo>
+                  <a:lnTo>
+                    <a:pt x="707652" y="455991"/>
+                  </a:lnTo>
+                  <a:lnTo>
+                    <a:pt x="439045" y="455991"/>
+                  </a:lnTo>
+                  <a:lnTo>
+                    <a:pt x="439045" y="447375"/>
+                  </a:lnTo>
+                  <a:lnTo>
+                    <a:pt x="413900" y="447375"/>
+                  </a:lnTo>
+                  <a:lnTo>
+                    <a:pt x="413900" y="455991"/>
+                  </a:lnTo>
+                  <a:lnTo>
+                    <a:pt x="32543" y="455991"/>
+                  </a:lnTo>
+                  <a:cubicBezTo>
+                    <a:pt x="14571" y="455991"/>
+                    <a:pt x="0" y="429387"/>
+                    <a:pt x="0" y="396569"/>
+                  </a:cubicBezTo>
+                  <a:cubicBezTo>
+                    <a:pt x="0" y="363751"/>
+                    <a:pt x="14571" y="337147"/>
+                    <a:pt x="32543" y="337147"/>
+                  </a:cubicBezTo>
+                  <a:lnTo>
+                    <a:pt x="32543" y="331292"/>
+                  </a:lnTo>
+                  <a:cubicBezTo>
+                    <a:pt x="14571" y="331292"/>
+                    <a:pt x="0" y="305795"/>
+                    <a:pt x="0" y="274344"/>
+                  </a:cubicBezTo>
+                  <a:cubicBezTo>
+                    <a:pt x="0" y="242892"/>
+                    <a:pt x="14571" y="217395"/>
+                    <a:pt x="32543" y="217395"/>
+                  </a:cubicBezTo>
+                  <a:lnTo>
+                    <a:pt x="32543" y="215403"/>
+                  </a:lnTo>
+                  <a:cubicBezTo>
+                    <a:pt x="14571" y="215403"/>
+                    <a:pt x="0" y="189176"/>
+                    <a:pt x="0" y="156823"/>
+                  </a:cubicBezTo>
+                  <a:cubicBezTo>
+                    <a:pt x="0" y="124469"/>
+                    <a:pt x="14571" y="98242"/>
+                    <a:pt x="32543" y="98242"/>
+                  </a:cubicBezTo>
+                  <a:lnTo>
+                    <a:pt x="32543" y="96530"/>
+                  </a:lnTo>
+                  <a:cubicBezTo>
+                    <a:pt x="14571" y="96530"/>
+                    <a:pt x="0" y="75005"/>
+                    <a:pt x="0" y="48454"/>
+                  </a:cubicBezTo>
+                  <a:cubicBezTo>
+                    <a:pt x="0" y="21902"/>
+                    <a:pt x="14571" y="377"/>
+                    <a:pt x="32543" y="377"/>
+                  </a:cubicBezTo>
+                  <a:lnTo>
+                    <a:pt x="32547" y="378"/>
+                  </a:lnTo>
+                  <a:lnTo>
+                    <a:pt x="413900" y="378"/>
+                  </a:lnTo>
+                  <a:lnTo>
+                    <a:pt x="413900" y="26892"/>
+                  </a:lnTo>
+                  <a:lnTo>
+                    <a:pt x="439045" y="26892"/>
+                  </a:lnTo>
+                  <a:lnTo>
+                    <a:pt x="439045" y="378"/>
+                  </a:lnTo>
+                  <a:lnTo>
+                    <a:pt x="707652" y="378"/>
+                  </a:lnTo>
+                  <a:lnTo>
+                    <a:pt x="707652" y="17943"/>
+                  </a:lnTo>
+                  <a:lnTo>
+                    <a:pt x="730118" y="17943"/>
+                  </a:lnTo>
+                  <a:lnTo>
+                    <a:pt x="730118" y="0"/>
+                  </a:lnTo>
+                  <a:lnTo>
+                    <a:pt x="935041" y="0"/>
+                  </a:lnTo>
+                  <a:cubicBezTo>
+                    <a:pt x="1018000" y="0"/>
+                    <a:pt x="1089444" y="54534"/>
+                    <a:pt x="1121252" y="133143"/>
+                  </a:cubicBezTo>
+                  <a:lnTo>
+                    <a:pt x="1171406" y="133143"/>
+                  </a:lnTo>
+                  <a:cubicBezTo>
+                    <a:pt x="1171469" y="125831"/>
+                    <a:pt x="1177470" y="119983"/>
+                    <a:pt x="1184836" y="119983"/>
+                  </a:cubicBezTo>
+                  <a:lnTo>
+                    <a:pt x="1239325" y="119983"/>
+                  </a:lnTo>
+                  <a:cubicBezTo>
+                    <a:pt x="1246848" y="119983"/>
+                    <a:pt x="1252947" y="126082"/>
+                    <a:pt x="1252947" y="133605"/>
+                  </a:cubicBezTo>
+                  <a:close/>
+                </a:path>
+              </a:pathLst>
+            </a:custGeom>
+            <a:solidFill>
+              <a:schemeClr val="bg1"/>
+            </a:solidFill>
+            <a:ln>
+              <a:noFill/>
+            </a:ln>
+          </p:spPr>
+          <p:style>
+            <a:lnRef idx="2">
+              <a:schemeClr val="accent1">
+                <a:shade val="50000"/>
+              </a:schemeClr>
+            </a:lnRef>
+            <a:fillRef idx="1">
+              <a:schemeClr val="accent1"/>
+            </a:fillRef>
+            <a:effectRef idx="0">
+              <a:schemeClr val="accent1"/>
+            </a:effectRef>
+            <a:fontRef idx="minor">
+              <a:schemeClr val="lt1"/>
+            </a:fontRef>
+          </p:style>
+          <p:txBody>
+            <a:bodyPr rtlCol="0" anchor="ctr"/>
+            <a:lstStyle/>
+            <a:p>
+              <a:pPr algn="ctr"/>
+              <a:endParaRPr lang="pt-BR"/>
+            </a:p>
+          </p:txBody>
+        </p:sp>
+      </p:grpSp>
+      <p:grpSp>
+        <p:nvGrpSpPr>
+          <p:cNvPr id="70" name="Grupo 69"/>
+          <p:cNvGrpSpPr/>
+          <p:nvPr/>
+        </p:nvGrpSpPr>
+        <p:grpSpPr>
+          <a:xfrm>
+            <a:off x="6021465" y="160050"/>
+            <a:ext cx="1636086" cy="2889900"/>
+            <a:chOff x="6021465" y="160050"/>
+            <a:chExt cx="1636086" cy="2889900"/>
+          </a:xfrm>
+        </p:grpSpPr>
+        <p:sp>
+          <p:nvSpPr>
+            <p:cNvPr id="86" name="Trapezoide 8"/>
+            <p:cNvSpPr/>
+            <p:nvPr/>
+          </p:nvSpPr>
+          <p:spPr>
+            <a:xfrm>
+              <a:off x="6068228" y="160050"/>
+              <a:ext cx="1528074" cy="794961"/>
+            </a:xfrm>
+            <a:custGeom>
+              <a:avLst/>
+              <a:gdLst/>
+              <a:ahLst/>
+              <a:cxnLst/>
+              <a:rect l="l" t="t" r="r" b="b"/>
+              <a:pathLst>
+                <a:path w="1471972" h="953157">
+                  <a:moveTo>
+                    <a:pt x="220133" y="0"/>
+                  </a:moveTo>
+                  <a:lnTo>
+                    <a:pt x="1251839" y="0"/>
+                  </a:lnTo>
+                  <a:cubicBezTo>
+                    <a:pt x="1293702" y="0"/>
+                    <a:pt x="1327639" y="33937"/>
+                    <a:pt x="1327639" y="75800"/>
+                  </a:cubicBezTo>
+                  <a:lnTo>
+                    <a:pt x="1327639" y="88369"/>
+                  </a:lnTo>
+                  <a:lnTo>
+                    <a:pt x="1471972" y="953157"/>
+                  </a:lnTo>
+                  <a:lnTo>
+                    <a:pt x="0" y="953157"/>
+                  </a:lnTo>
+                  <a:lnTo>
+                    <a:pt x="144333" y="88369"/>
+                  </a:lnTo>
+                  <a:lnTo>
+                    <a:pt x="144333" y="75800"/>
+                  </a:lnTo>
+                  <a:cubicBezTo>
+                    <a:pt x="144333" y="33937"/>
+                    <a:pt x="178270" y="0"/>
+                    <a:pt x="220133" y="0"/>
+                  </a:cubicBezTo>
+                  <a:close/>
+                </a:path>
+              </a:pathLst>
+            </a:custGeom>
+            <a:solidFill>
+              <a:srgbClr val="03A9F4"/>
+            </a:solidFill>
+            <a:ln>
+              <a:noFill/>
+            </a:ln>
+          </p:spPr>
+          <p:style>
+            <a:lnRef idx="2">
+              <a:schemeClr val="accent1">
+                <a:shade val="50000"/>
+              </a:schemeClr>
+            </a:lnRef>
+            <a:fillRef idx="1">
+              <a:schemeClr val="accent1"/>
+            </a:fillRef>
+            <a:effectRef idx="0">
+              <a:schemeClr val="accent1"/>
+            </a:effectRef>
+            <a:fontRef idx="minor">
+              <a:schemeClr val="lt1"/>
+            </a:fontRef>
+          </p:style>
+          <p:txBody>
+            <a:bodyPr rtlCol="0" anchor="ctr"/>
+            <a:lstStyle/>
+            <a:p>
+              <a:pPr algn="ctr"/>
+              <a:endParaRPr lang="pt-BR"/>
+            </a:p>
+          </p:txBody>
+        </p:sp>
+        <p:sp>
+          <p:nvSpPr>
+            <p:cNvPr id="87" name="Retângulo de cantos arredondados 86"/>
+            <p:cNvSpPr/>
+            <p:nvPr/>
+          </p:nvSpPr>
+          <p:spPr>
+            <a:xfrm>
+              <a:off x="6065794" y="844652"/>
+              <a:ext cx="1548882" cy="2205298"/>
+            </a:xfrm>
+            <a:prstGeom prst="roundRect">
+              <a:avLst>
+                <a:gd name="adj" fmla="val 9439"/>
+              </a:avLst>
+            </a:prstGeom>
+            <a:solidFill>
+              <a:srgbClr val="03A9F4"/>
+            </a:solidFill>
+            <a:ln>
+              <a:noFill/>
+            </a:ln>
+          </p:spPr>
+          <p:style>
+            <a:lnRef idx="2">
+              <a:schemeClr val="accent1">
+                <a:shade val="50000"/>
+              </a:schemeClr>
+            </a:lnRef>
+            <a:fillRef idx="1">
+              <a:schemeClr val="accent1"/>
+            </a:fillRef>
+            <a:effectRef idx="0">
+              <a:schemeClr val="accent1"/>
+            </a:effectRef>
+            <a:fontRef idx="minor">
+              <a:schemeClr val="lt1"/>
+            </a:fontRef>
+          </p:style>
+          <p:txBody>
+            <a:bodyPr rtlCol="0" anchor="ctr"/>
+            <a:lstStyle/>
+            <a:p>
+              <a:pPr algn="ctr"/>
+              <a:endParaRPr lang="pt-BR"/>
+            </a:p>
+          </p:txBody>
+        </p:sp>
+        <p:sp>
+          <p:nvSpPr>
+            <p:cNvPr id="88" name="Retângulo de cantos arredondados 87"/>
+            <p:cNvSpPr/>
+            <p:nvPr/>
+          </p:nvSpPr>
+          <p:spPr>
+            <a:xfrm>
+              <a:off x="6021465" y="868823"/>
+              <a:ext cx="1636086" cy="172375"/>
+            </a:xfrm>
+            <a:prstGeom prst="roundRect">
+              <a:avLst>
+                <a:gd name="adj" fmla="val 43974"/>
+              </a:avLst>
+            </a:prstGeom>
+            <a:solidFill>
+              <a:srgbClr val="02618C"/>
+            </a:solidFill>
+            <a:ln>
+              <a:noFill/>
+            </a:ln>
+          </p:spPr>
+          <p:style>
+            <a:lnRef idx="2">
+              <a:schemeClr val="accent1">
+                <a:shade val="50000"/>
+              </a:schemeClr>
+            </a:lnRef>
+            <a:fillRef idx="1">
+              <a:schemeClr val="accent1"/>
+            </a:fillRef>
+            <a:effectRef idx="0">
+              <a:schemeClr val="accent1"/>
+            </a:effectRef>
+            <a:fontRef idx="minor">
+              <a:schemeClr val="lt1"/>
+            </a:fontRef>
+          </p:style>
+          <p:txBody>
+            <a:bodyPr rtlCol="0" anchor="ctr"/>
+            <a:lstStyle/>
+            <a:p>
+              <a:pPr algn="ctr"/>
+              <a:endParaRPr lang="pt-BR"/>
+            </a:p>
+          </p:txBody>
+        </p:sp>
+        <p:sp>
+          <p:nvSpPr>
+            <p:cNvPr id="89" name="Trapezoide 8"/>
+            <p:cNvSpPr/>
+            <p:nvPr/>
+          </p:nvSpPr>
+          <p:spPr>
+            <a:xfrm>
+              <a:off x="6362384" y="241638"/>
+              <a:ext cx="938643" cy="506929"/>
+            </a:xfrm>
+            <a:custGeom>
+              <a:avLst/>
+              <a:gdLst/>
+              <a:ahLst/>
+              <a:cxnLst/>
+              <a:rect l="l" t="t" r="r" b="b"/>
+              <a:pathLst>
+                <a:path w="1471972" h="953157">
+                  <a:moveTo>
+                    <a:pt x="220133" y="0"/>
+                  </a:moveTo>
+                  <a:lnTo>
+                    <a:pt x="1251839" y="0"/>
+                  </a:lnTo>
+                  <a:cubicBezTo>
+                    <a:pt x="1293702" y="0"/>
+                    <a:pt x="1327639" y="33937"/>
+                    <a:pt x="1327639" y="75800"/>
+                  </a:cubicBezTo>
+                  <a:lnTo>
+                    <a:pt x="1327639" y="88369"/>
+                  </a:lnTo>
+                  <a:lnTo>
+                    <a:pt x="1471972" y="953157"/>
+                  </a:lnTo>
+                  <a:lnTo>
+                    <a:pt x="0" y="953157"/>
+                  </a:lnTo>
+                  <a:lnTo>
+                    <a:pt x="144333" y="88369"/>
+                  </a:lnTo>
+                  <a:lnTo>
+                    <a:pt x="144333" y="75800"/>
+                  </a:lnTo>
+                  <a:cubicBezTo>
+                    <a:pt x="144333" y="33937"/>
+                    <a:pt x="178270" y="0"/>
+                    <a:pt x="220133" y="0"/>
+                  </a:cubicBezTo>
+                  <a:close/>
+                </a:path>
+              </a:pathLst>
+            </a:custGeom>
+            <a:solidFill>
+              <a:srgbClr val="02618C"/>
+            </a:solidFill>
+            <a:ln>
+              <a:noFill/>
+            </a:ln>
+          </p:spPr>
+          <p:style>
+            <a:lnRef idx="2">
+              <a:schemeClr val="accent1">
+                <a:shade val="50000"/>
+              </a:schemeClr>
+            </a:lnRef>
+            <a:fillRef idx="1">
+              <a:schemeClr val="accent1"/>
+            </a:fillRef>
+            <a:effectRef idx="0">
+              <a:schemeClr val="accent1"/>
+            </a:effectRef>
+            <a:fontRef idx="minor">
+              <a:schemeClr val="lt1"/>
+            </a:fontRef>
+          </p:style>
+          <p:txBody>
+            <a:bodyPr rtlCol="0" anchor="ctr"/>
+            <a:lstStyle/>
+            <a:p>
+              <a:pPr algn="ctr"/>
+              <a:endParaRPr lang="pt-BR"/>
+            </a:p>
+          </p:txBody>
+        </p:sp>
+      </p:grpSp>
+      <p:grpSp>
+        <p:nvGrpSpPr>
+          <p:cNvPr id="52" name="Grupo 51"/>
+          <p:cNvGrpSpPr/>
+          <p:nvPr/>
+        </p:nvGrpSpPr>
+        <p:grpSpPr>
+          <a:xfrm>
+            <a:off x="3853359" y="245734"/>
+            <a:ext cx="1636086" cy="2889900"/>
+            <a:chOff x="4959719" y="2667977"/>
+            <a:chExt cx="1636086" cy="2889900"/>
+          </a:xfrm>
+        </p:grpSpPr>
+        <p:sp>
+          <p:nvSpPr>
+            <p:cNvPr id="66" name="Trapezoide 8"/>
+            <p:cNvSpPr/>
+            <p:nvPr/>
+          </p:nvSpPr>
+          <p:spPr>
+            <a:xfrm>
+              <a:off x="5006482" y="2667977"/>
+              <a:ext cx="1528074" cy="794961"/>
+            </a:xfrm>
+            <a:custGeom>
+              <a:avLst/>
+              <a:gdLst/>
+              <a:ahLst/>
+              <a:cxnLst/>
+              <a:rect l="l" t="t" r="r" b="b"/>
+              <a:pathLst>
+                <a:path w="1471972" h="953157">
+                  <a:moveTo>
+                    <a:pt x="220133" y="0"/>
+                  </a:moveTo>
+                  <a:lnTo>
+                    <a:pt x="1251839" y="0"/>
+                  </a:lnTo>
+                  <a:cubicBezTo>
+                    <a:pt x="1293702" y="0"/>
+                    <a:pt x="1327639" y="33937"/>
+                    <a:pt x="1327639" y="75800"/>
+                  </a:cubicBezTo>
+                  <a:lnTo>
+                    <a:pt x="1327639" y="88369"/>
+                  </a:lnTo>
+                  <a:lnTo>
+                    <a:pt x="1471972" y="953157"/>
+                  </a:lnTo>
+                  <a:lnTo>
+                    <a:pt x="0" y="953157"/>
+                  </a:lnTo>
+                  <a:lnTo>
+                    <a:pt x="144333" y="88369"/>
+                  </a:lnTo>
+                  <a:lnTo>
+                    <a:pt x="144333" y="75800"/>
+                  </a:lnTo>
+                  <a:cubicBezTo>
+                    <a:pt x="144333" y="33937"/>
+                    <a:pt x="178270" y="0"/>
+                    <a:pt x="220133" y="0"/>
+                  </a:cubicBezTo>
+                  <a:close/>
+                </a:path>
+              </a:pathLst>
+            </a:custGeom>
+            <a:solidFill>
+              <a:srgbClr val="FDD835"/>
+            </a:solidFill>
+            <a:ln>
+              <a:noFill/>
+            </a:ln>
+          </p:spPr>
+          <p:style>
+            <a:lnRef idx="2">
+              <a:schemeClr val="accent1">
+                <a:shade val="50000"/>
+              </a:schemeClr>
+            </a:lnRef>
+            <a:fillRef idx="1">
+              <a:schemeClr val="accent1"/>
+            </a:fillRef>
+            <a:effectRef idx="0">
+              <a:schemeClr val="accent1"/>
+            </a:effectRef>
+            <a:fontRef idx="minor">
+              <a:schemeClr val="lt1"/>
+            </a:fontRef>
+          </p:style>
+          <p:txBody>
+            <a:bodyPr rtlCol="0" anchor="ctr"/>
+            <a:lstStyle/>
+            <a:p>
+              <a:pPr algn="ctr"/>
+              <a:endParaRPr lang="pt-BR"/>
+            </a:p>
+          </p:txBody>
+        </p:sp>
+        <p:sp>
+          <p:nvSpPr>
+            <p:cNvPr id="67" name="Retângulo de cantos arredondados 66"/>
+            <p:cNvSpPr/>
+            <p:nvPr/>
+          </p:nvSpPr>
+          <p:spPr>
+            <a:xfrm>
+              <a:off x="5004048" y="3352579"/>
+              <a:ext cx="1548882" cy="2205298"/>
+            </a:xfrm>
+            <a:prstGeom prst="roundRect">
+              <a:avLst>
+                <a:gd name="adj" fmla="val 9439"/>
+              </a:avLst>
+            </a:prstGeom>
+            <a:solidFill>
+              <a:srgbClr val="FDD835"/>
+            </a:solidFill>
+            <a:ln>
+              <a:noFill/>
+            </a:ln>
+          </p:spPr>
+          <p:style>
+            <a:lnRef idx="2">
+              <a:schemeClr val="accent1">
+                <a:shade val="50000"/>
+              </a:schemeClr>
+            </a:lnRef>
+            <a:fillRef idx="1">
+              <a:schemeClr val="accent1"/>
+            </a:fillRef>
+            <a:effectRef idx="0">
+              <a:schemeClr val="accent1"/>
+            </a:effectRef>
+            <a:fontRef idx="minor">
+              <a:schemeClr val="lt1"/>
+            </a:fontRef>
+          </p:style>
+          <p:txBody>
+            <a:bodyPr rtlCol="0" anchor="ctr"/>
+            <a:lstStyle/>
+            <a:p>
+              <a:pPr algn="ctr"/>
+              <a:endParaRPr lang="pt-BR"/>
+            </a:p>
+          </p:txBody>
+        </p:sp>
+        <p:sp>
+          <p:nvSpPr>
+            <p:cNvPr id="68" name="Retângulo de cantos arredondados 67"/>
+            <p:cNvSpPr/>
+            <p:nvPr/>
+          </p:nvSpPr>
+          <p:spPr>
+            <a:xfrm>
+              <a:off x="4959719" y="3376750"/>
+              <a:ext cx="1636086" cy="172375"/>
+            </a:xfrm>
+            <a:prstGeom prst="roundRect">
+              <a:avLst>
+                <a:gd name="adj" fmla="val 43974"/>
+              </a:avLst>
+            </a:prstGeom>
+            <a:solidFill>
+              <a:srgbClr val="D4AC02"/>
+            </a:solidFill>
+            <a:ln>
+              <a:noFill/>
+            </a:ln>
+          </p:spPr>
+          <p:style>
+            <a:lnRef idx="2">
+              <a:schemeClr val="accent1">
+                <a:shade val="50000"/>
+              </a:schemeClr>
+            </a:lnRef>
+            <a:fillRef idx="1">
+              <a:schemeClr val="accent1"/>
+            </a:fillRef>
+            <a:effectRef idx="0">
+              <a:schemeClr val="accent1"/>
+            </a:effectRef>
+            <a:fontRef idx="minor">
+              <a:schemeClr val="lt1"/>
+            </a:fontRef>
+          </p:style>
+          <p:txBody>
+            <a:bodyPr rtlCol="0" anchor="ctr"/>
+            <a:lstStyle/>
+            <a:p>
+              <a:pPr algn="ctr"/>
+              <a:endParaRPr lang="pt-BR"/>
+            </a:p>
+          </p:txBody>
+        </p:sp>
+        <p:sp>
+          <p:nvSpPr>
+            <p:cNvPr id="69" name="Trapezoide 8"/>
+            <p:cNvSpPr/>
+            <p:nvPr/>
+          </p:nvSpPr>
+          <p:spPr>
+            <a:xfrm>
+              <a:off x="5300638" y="2749565"/>
+              <a:ext cx="938643" cy="506929"/>
+            </a:xfrm>
+            <a:custGeom>
+              <a:avLst/>
+              <a:gdLst/>
+              <a:ahLst/>
+              <a:cxnLst/>
+              <a:rect l="l" t="t" r="r" b="b"/>
+              <a:pathLst>
+                <a:path w="1471972" h="953157">
+                  <a:moveTo>
+                    <a:pt x="220133" y="0"/>
+                  </a:moveTo>
+                  <a:lnTo>
+                    <a:pt x="1251839" y="0"/>
+                  </a:lnTo>
+                  <a:cubicBezTo>
+                    <a:pt x="1293702" y="0"/>
+                    <a:pt x="1327639" y="33937"/>
+                    <a:pt x="1327639" y="75800"/>
+                  </a:cubicBezTo>
+                  <a:lnTo>
+                    <a:pt x="1327639" y="88369"/>
+                  </a:lnTo>
+                  <a:lnTo>
+                    <a:pt x="1471972" y="953157"/>
+                  </a:lnTo>
+                  <a:lnTo>
+                    <a:pt x="0" y="953157"/>
+                  </a:lnTo>
+                  <a:lnTo>
+                    <a:pt x="144333" y="88369"/>
+                  </a:lnTo>
+                  <a:lnTo>
+                    <a:pt x="144333" y="75800"/>
+                  </a:lnTo>
+                  <a:cubicBezTo>
+                    <a:pt x="144333" y="33937"/>
+                    <a:pt x="178270" y="0"/>
+                    <a:pt x="220133" y="0"/>
+                  </a:cubicBezTo>
+                  <a:close/>
+                </a:path>
+              </a:pathLst>
+            </a:custGeom>
+            <a:solidFill>
+              <a:srgbClr val="D4AC02"/>
+            </a:solidFill>
+            <a:ln>
+              <a:noFill/>
+            </a:ln>
+          </p:spPr>
+          <p:style>
+            <a:lnRef idx="2">
+              <a:schemeClr val="accent1">
+                <a:shade val="50000"/>
+              </a:schemeClr>
+            </a:lnRef>
+            <a:fillRef idx="1">
+              <a:schemeClr val="accent1"/>
+            </a:fillRef>
+            <a:effectRef idx="0">
+              <a:schemeClr val="accent1"/>
+            </a:effectRef>
+            <a:fontRef idx="minor">
+              <a:schemeClr val="lt1"/>
+            </a:fontRef>
+          </p:style>
+          <p:txBody>
+            <a:bodyPr rtlCol="0" anchor="ctr"/>
+            <a:lstStyle/>
+            <a:p>
+              <a:pPr algn="ctr"/>
+              <a:endParaRPr lang="pt-BR"/>
+            </a:p>
+          </p:txBody>
+        </p:sp>
+      </p:grpSp>
+      <p:grpSp>
+        <p:nvGrpSpPr>
+          <p:cNvPr id="94" name="Grupo 93"/>
+          <p:cNvGrpSpPr/>
+          <p:nvPr/>
+        </p:nvGrpSpPr>
+        <p:grpSpPr>
+          <a:xfrm>
+            <a:off x="6501953" y="1557775"/>
+            <a:ext cx="843109" cy="882515"/>
+            <a:chOff x="6418746" y="1441922"/>
+            <a:chExt cx="953348" cy="997906"/>
+          </a:xfrm>
+        </p:grpSpPr>
+        <p:grpSp>
+          <p:nvGrpSpPr>
+            <p:cNvPr id="75" name="Grupo 74"/>
+            <p:cNvGrpSpPr/>
+            <p:nvPr/>
+          </p:nvGrpSpPr>
+          <p:grpSpPr>
+            <a:xfrm>
+              <a:off x="6418746" y="1441922"/>
+              <a:ext cx="953348" cy="997906"/>
+              <a:chOff x="6907636" y="1772816"/>
+              <a:chExt cx="2447663" cy="2562063"/>
+            </a:xfrm>
+          </p:grpSpPr>
+          <p:sp>
+            <p:nvSpPr>
+              <p:cNvPr id="74" name="Retângulo 73"/>
+              <p:cNvSpPr/>
+              <p:nvPr/>
+            </p:nvSpPr>
+            <p:spPr>
+              <a:xfrm>
+                <a:off x="6907636" y="1772816"/>
+                <a:ext cx="1827880" cy="2520280"/>
+              </a:xfrm>
+              <a:prstGeom prst="rect">
+                <a:avLst/>
+              </a:prstGeom>
+              <a:solidFill>
+                <a:schemeClr val="bg1"/>
+              </a:solidFill>
+              <a:ln>
+                <a:noFill/>
+              </a:ln>
+            </p:spPr>
+            <p:style>
+              <a:lnRef idx="2">
+                <a:schemeClr val="accent1">
+                  <a:shade val="50000"/>
+                </a:schemeClr>
+              </a:lnRef>
+              <a:fillRef idx="1">
+                <a:schemeClr val="accent1"/>
+              </a:fillRef>
+              <a:effectRef idx="0">
+                <a:schemeClr val="accent1"/>
+              </a:effectRef>
+              <a:fontRef idx="minor">
+                <a:schemeClr val="lt1"/>
+              </a:fontRef>
+            </p:style>
+            <p:txBody>
+              <a:bodyPr rtlCol="0" anchor="ctr"/>
+              <a:lstStyle/>
+              <a:p>
+                <a:pPr algn="ctr"/>
+                <a:endParaRPr lang="pt-BR"/>
+              </a:p>
+            </p:txBody>
+          </p:sp>
+          <p:sp>
+            <p:nvSpPr>
+              <p:cNvPr id="106" name="Retângulo 105"/>
+              <p:cNvSpPr/>
+              <p:nvPr/>
+            </p:nvSpPr>
+            <p:spPr>
+              <a:xfrm rot="1050433">
+                <a:off x="7527419" y="1814599"/>
+                <a:ext cx="1827880" cy="2520280"/>
+              </a:xfrm>
+              <a:prstGeom prst="rect">
+                <a:avLst/>
+              </a:prstGeom>
+              <a:solidFill>
+                <a:schemeClr val="bg1"/>
+              </a:solidFill>
+              <a:ln>
+                <a:noFill/>
+              </a:ln>
+            </p:spPr>
+            <p:style>
+              <a:lnRef idx="2">
+                <a:schemeClr val="accent1">
+                  <a:shade val="50000"/>
+                </a:schemeClr>
+              </a:lnRef>
+              <a:fillRef idx="1">
+                <a:schemeClr val="accent1"/>
+              </a:fillRef>
+              <a:effectRef idx="0">
+                <a:schemeClr val="accent1"/>
+              </a:effectRef>
+              <a:fontRef idx="minor">
+                <a:schemeClr val="lt1"/>
+              </a:fontRef>
+            </p:style>
+            <p:txBody>
+              <a:bodyPr rtlCol="0" anchor="ctr"/>
+              <a:lstStyle/>
+              <a:p>
+                <a:pPr algn="ctr"/>
+                <a:endParaRPr lang="pt-BR"/>
+              </a:p>
+            </p:txBody>
+          </p:sp>
+        </p:grpSp>
+        <p:cxnSp>
+          <p:nvCxnSpPr>
+            <p:cNvPr id="77" name="Conector reto 76"/>
+            <p:cNvCxnSpPr/>
+            <p:nvPr/>
+          </p:nvCxnSpPr>
+          <p:spPr>
+            <a:xfrm>
+              <a:off x="6902093" y="1558745"/>
+              <a:ext cx="457200" cy="142063"/>
+            </a:xfrm>
+            <a:prstGeom prst="line">
+              <a:avLst/>
+            </a:prstGeom>
+            <a:ln>
+              <a:solidFill>
+                <a:srgbClr val="03A9F4"/>
+              </a:solidFill>
+            </a:ln>
+          </p:spPr>
+          <p:style>
+            <a:lnRef idx="1">
+              <a:schemeClr val="accent1"/>
+            </a:lnRef>
+            <a:fillRef idx="0">
+              <a:schemeClr val="accent1"/>
+            </a:fillRef>
+            <a:effectRef idx="0">
+              <a:schemeClr val="accent1"/>
+            </a:effectRef>
+            <a:fontRef idx="minor">
+              <a:schemeClr val="tx1"/>
+            </a:fontRef>
+          </p:style>
+        </p:cxnSp>
+        <p:cxnSp>
+          <p:nvCxnSpPr>
+            <p:cNvPr id="111" name="Conector reto 110"/>
+            <p:cNvCxnSpPr/>
+            <p:nvPr/>
+          </p:nvCxnSpPr>
+          <p:spPr>
+            <a:xfrm>
+              <a:off x="6719445" y="2047470"/>
+              <a:ext cx="457200" cy="142063"/>
+            </a:xfrm>
+            <a:prstGeom prst="line">
+              <a:avLst/>
+            </a:prstGeom>
+            <a:ln>
+              <a:solidFill>
+                <a:srgbClr val="03A9F4"/>
+              </a:solidFill>
+            </a:ln>
+          </p:spPr>
+          <p:style>
+            <a:lnRef idx="1">
+              <a:schemeClr val="accent1"/>
+            </a:lnRef>
+            <a:fillRef idx="0">
+              <a:schemeClr val="accent1"/>
+            </a:fillRef>
+            <a:effectRef idx="0">
+              <a:schemeClr val="accent1"/>
+            </a:effectRef>
+            <a:fontRef idx="minor">
+              <a:schemeClr val="tx1"/>
+            </a:fontRef>
+          </p:style>
+        </p:cxnSp>
+        <p:cxnSp>
+          <p:nvCxnSpPr>
+            <p:cNvPr id="112" name="Conector reto 111"/>
+            <p:cNvCxnSpPr/>
+            <p:nvPr/>
+          </p:nvCxnSpPr>
+          <p:spPr>
+            <a:xfrm>
+              <a:off x="6831705" y="1778988"/>
+              <a:ext cx="457200" cy="142063"/>
+            </a:xfrm>
+            <a:prstGeom prst="line">
+              <a:avLst/>
+            </a:prstGeom>
+            <a:ln>
+              <a:solidFill>
+                <a:srgbClr val="03A9F4"/>
+              </a:solidFill>
+            </a:ln>
+          </p:spPr>
+          <p:style>
+            <a:lnRef idx="1">
+              <a:schemeClr val="accent1"/>
+            </a:lnRef>
+            <a:fillRef idx="0">
+              <a:schemeClr val="accent1"/>
+            </a:fillRef>
+            <a:effectRef idx="0">
+              <a:schemeClr val="accent1"/>
+            </a:effectRef>
+            <a:fontRef idx="minor">
+              <a:schemeClr val="tx1"/>
+            </a:fontRef>
+          </p:style>
+        </p:cxnSp>
+      </p:grpSp>
+      <p:sp>
+        <p:nvSpPr>
+          <p:cNvPr id="85" name="Arredondar Retângulo em um Canto Único 84"/>
+          <p:cNvSpPr/>
+          <p:nvPr/>
+        </p:nvSpPr>
+        <p:spPr>
+          <a:xfrm>
+            <a:off x="4412119" y="1457832"/>
+            <a:ext cx="520019" cy="1082402"/>
+          </a:xfrm>
+          <a:custGeom>
+            <a:avLst/>
+            <a:gdLst/>
+            <a:ahLst/>
+            <a:cxnLst/>
+            <a:rect l="l" t="t" r="r" b="b"/>
+            <a:pathLst>
+              <a:path w="2008631" h="4180898">
+                <a:moveTo>
+                  <a:pt x="1369500" y="0"/>
+                </a:moveTo>
+                <a:cubicBezTo>
+                  <a:pt x="1488807" y="0"/>
+                  <a:pt x="1585524" y="111512"/>
+                  <a:pt x="1585524" y="249068"/>
+                </a:cubicBezTo>
+                <a:lnTo>
+                  <a:pt x="1585524" y="397321"/>
+                </a:lnTo>
+                <a:lnTo>
+                  <a:pt x="1676391" y="397321"/>
+                </a:lnTo>
+                <a:cubicBezTo>
+                  <a:pt x="1702904" y="397321"/>
+                  <a:pt x="1724397" y="418814"/>
+                  <a:pt x="1724397" y="445327"/>
+                </a:cubicBezTo>
+                <a:lnTo>
+                  <a:pt x="1724397" y="647084"/>
+                </a:lnTo>
+                <a:cubicBezTo>
+                  <a:pt x="1891501" y="718109"/>
+                  <a:pt x="2008631" y="883784"/>
+                  <a:pt x="2008631" y="1076816"/>
+                </a:cubicBezTo>
+                <a:lnTo>
+                  <a:pt x="2008631" y="3489176"/>
+                </a:lnTo>
+                <a:cubicBezTo>
+                  <a:pt x="2008631" y="3677356"/>
+                  <a:pt x="1897315" y="3839537"/>
+                  <a:pt x="1736437" y="3912374"/>
+                </a:cubicBezTo>
+                <a:cubicBezTo>
+                  <a:pt x="1743198" y="3919936"/>
+                  <a:pt x="1746825" y="3929981"/>
+                  <a:pt x="1746825" y="3940872"/>
+                </a:cubicBezTo>
+                <a:lnTo>
+                  <a:pt x="1746825" y="4180898"/>
+                </a:lnTo>
+                <a:lnTo>
+                  <a:pt x="306665" y="4180898"/>
+                </a:lnTo>
+                <a:lnTo>
+                  <a:pt x="306665" y="3926094"/>
+                </a:lnTo>
+                <a:cubicBezTo>
+                  <a:pt x="127452" y="3862124"/>
+                  <a:pt x="0" y="3690534"/>
+                  <a:pt x="0" y="3489176"/>
+                </a:cubicBezTo>
+                <a:lnTo>
+                  <a:pt x="0" y="1076816"/>
+                </a:lnTo>
+                <a:cubicBezTo>
+                  <a:pt x="0" y="883783"/>
+                  <a:pt x="117131" y="718107"/>
+                  <a:pt x="284237" y="647082"/>
+                </a:cubicBezTo>
+                <a:lnTo>
+                  <a:pt x="284237" y="397321"/>
+                </a:lnTo>
+                <a:lnTo>
+                  <a:pt x="1153476" y="397321"/>
+                </a:lnTo>
+                <a:lnTo>
+                  <a:pt x="1153476" y="249068"/>
+                </a:lnTo>
+                <a:cubicBezTo>
+                  <a:pt x="1153476" y="111512"/>
+                  <a:pt x="1250193" y="0"/>
+                  <a:pt x="1369500" y="0"/>
+                </a:cubicBezTo>
+                <a:close/>
+              </a:path>
+            </a:pathLst>
+          </a:custGeom>
+          <a:solidFill>
+            <a:schemeClr val="bg1"/>
+          </a:solidFill>
+          <a:ln>
+            <a:noFill/>
+          </a:ln>
+        </p:spPr>
+        <p:style>
+          <a:lnRef idx="2">
+            <a:schemeClr val="accent1">
+              <a:shade val="50000"/>
+            </a:schemeClr>
+          </a:lnRef>
+          <a:fillRef idx="1">
+            <a:schemeClr val="accent1"/>
+          </a:fillRef>
+          <a:effectRef idx="0">
+            <a:schemeClr val="accent1"/>
+          </a:effectRef>
+          <a:fontRef idx="minor">
+            <a:schemeClr val="lt1"/>
+          </a:fontRef>
+        </p:style>
+        <p:txBody>
+          <a:bodyPr rtlCol="0" anchor="ctr"/>
+          <a:lstStyle/>
+          <a:p>
+            <a:pPr algn="ctr"/>
+            <a:endParaRPr lang="pt-BR"/>
+          </a:p>
+        </p:txBody>
+      </p:sp>
+    </p:spTree>
+    <p:extLst>
+      <p:ext uri="{BB962C8B-B14F-4D97-AF65-F5344CB8AC3E}">
+        <p14:creationId xmlns:p14="http://schemas.microsoft.com/office/powerpoint/2010/main" val="4055732396"/>
+      </p:ext>
+    </p:extLst>
+  </p:cSld>
+  <p:clrMapOvr>
+    <a:masterClrMapping/>
+  </p:clrMapOvr>
+</p:sld>
+</file>
+
 <file path=ppt/theme/theme1.xml><?xml version="1.0" encoding="utf-8"?>
 <a:theme xmlns:a="http://schemas.openxmlformats.org/drawingml/2006/main" name="Tema do Office">
   <a:themeElements>

</xml_diff>